<commit_message>
finish monocular video based mocap
</commit_message>
<xml_diff>
--- a/视频人体动捕技术/imgs/edit.pptx
+++ b/视频人体动捕技术/imgs/edit.pptx
@@ -8,6 +8,7 @@
     <p:sldId id="256" r:id="rId2"/>
     <p:sldId id="257" r:id="rId3"/>
     <p:sldId id="258" r:id="rId4"/>
+    <p:sldId id="259" r:id="rId5"/>
   </p:sldIdLst>
   <p:sldSz cx="12192000" cy="6858000"/>
   <p:notesSz cx="6858000" cy="9144000"/>
@@ -261,7 +262,7 @@
           <a:p>
             <a:fld id="{69B82418-4580-4E23-A80E-2AC1137F7F07}" type="datetimeFigureOut">
               <a:rPr lang="zh-CN" altLang="en-US" smtClean="0"/>
-              <a:t>2020/8/30 Sunday</a:t>
+              <a:t>2020/8/31 Monday</a:t>
             </a:fld>
             <a:endParaRPr lang="zh-CN" altLang="en-US"/>
           </a:p>
@@ -459,7 +460,7 @@
           <a:p>
             <a:fld id="{69B82418-4580-4E23-A80E-2AC1137F7F07}" type="datetimeFigureOut">
               <a:rPr lang="zh-CN" altLang="en-US" smtClean="0"/>
-              <a:t>2020/8/30 Sunday</a:t>
+              <a:t>2020/8/31 Monday</a:t>
             </a:fld>
             <a:endParaRPr lang="zh-CN" altLang="en-US"/>
           </a:p>
@@ -667,7 +668,7 @@
           <a:p>
             <a:fld id="{69B82418-4580-4E23-A80E-2AC1137F7F07}" type="datetimeFigureOut">
               <a:rPr lang="zh-CN" altLang="en-US" smtClean="0"/>
-              <a:t>2020/8/30 Sunday</a:t>
+              <a:t>2020/8/31 Monday</a:t>
             </a:fld>
             <a:endParaRPr lang="zh-CN" altLang="en-US"/>
           </a:p>
@@ -865,7 +866,7 @@
           <a:p>
             <a:fld id="{69B82418-4580-4E23-A80E-2AC1137F7F07}" type="datetimeFigureOut">
               <a:rPr lang="zh-CN" altLang="en-US" smtClean="0"/>
-              <a:t>2020/8/30 Sunday</a:t>
+              <a:t>2020/8/31 Monday</a:t>
             </a:fld>
             <a:endParaRPr lang="zh-CN" altLang="en-US"/>
           </a:p>
@@ -1140,7 +1141,7 @@
           <a:p>
             <a:fld id="{69B82418-4580-4E23-A80E-2AC1137F7F07}" type="datetimeFigureOut">
               <a:rPr lang="zh-CN" altLang="en-US" smtClean="0"/>
-              <a:t>2020/8/30 Sunday</a:t>
+              <a:t>2020/8/31 Monday</a:t>
             </a:fld>
             <a:endParaRPr lang="zh-CN" altLang="en-US"/>
           </a:p>
@@ -1405,7 +1406,7 @@
           <a:p>
             <a:fld id="{69B82418-4580-4E23-A80E-2AC1137F7F07}" type="datetimeFigureOut">
               <a:rPr lang="zh-CN" altLang="en-US" smtClean="0"/>
-              <a:t>2020/8/30 Sunday</a:t>
+              <a:t>2020/8/31 Monday</a:t>
             </a:fld>
             <a:endParaRPr lang="zh-CN" altLang="en-US"/>
           </a:p>
@@ -1817,7 +1818,7 @@
           <a:p>
             <a:fld id="{69B82418-4580-4E23-A80E-2AC1137F7F07}" type="datetimeFigureOut">
               <a:rPr lang="zh-CN" altLang="en-US" smtClean="0"/>
-              <a:t>2020/8/30 Sunday</a:t>
+              <a:t>2020/8/31 Monday</a:t>
             </a:fld>
             <a:endParaRPr lang="zh-CN" altLang="en-US"/>
           </a:p>
@@ -1958,7 +1959,7 @@
           <a:p>
             <a:fld id="{69B82418-4580-4E23-A80E-2AC1137F7F07}" type="datetimeFigureOut">
               <a:rPr lang="zh-CN" altLang="en-US" smtClean="0"/>
-              <a:t>2020/8/30 Sunday</a:t>
+              <a:t>2020/8/31 Monday</a:t>
             </a:fld>
             <a:endParaRPr lang="zh-CN" altLang="en-US"/>
           </a:p>
@@ -2071,7 +2072,7 @@
           <a:p>
             <a:fld id="{69B82418-4580-4E23-A80E-2AC1137F7F07}" type="datetimeFigureOut">
               <a:rPr lang="zh-CN" altLang="en-US" smtClean="0"/>
-              <a:t>2020/8/30 Sunday</a:t>
+              <a:t>2020/8/31 Monday</a:t>
             </a:fld>
             <a:endParaRPr lang="zh-CN" altLang="en-US"/>
           </a:p>
@@ -2382,7 +2383,7 @@
           <a:p>
             <a:fld id="{69B82418-4580-4E23-A80E-2AC1137F7F07}" type="datetimeFigureOut">
               <a:rPr lang="zh-CN" altLang="en-US" smtClean="0"/>
-              <a:t>2020/8/30 Sunday</a:t>
+              <a:t>2020/8/31 Monday</a:t>
             </a:fld>
             <a:endParaRPr lang="zh-CN" altLang="en-US"/>
           </a:p>
@@ -2670,7 +2671,7 @@
           <a:p>
             <a:fld id="{69B82418-4580-4E23-A80E-2AC1137F7F07}" type="datetimeFigureOut">
               <a:rPr lang="zh-CN" altLang="en-US" smtClean="0"/>
-              <a:t>2020/8/30 Sunday</a:t>
+              <a:t>2020/8/31 Monday</a:t>
             </a:fld>
             <a:endParaRPr lang="zh-CN" altLang="en-US"/>
           </a:p>
@@ -2911,7 +2912,7 @@
           <a:p>
             <a:fld id="{69B82418-4580-4E23-A80E-2AC1137F7F07}" type="datetimeFigureOut">
               <a:rPr lang="zh-CN" altLang="en-US" smtClean="0"/>
-              <a:t>2020/8/30 Sunday</a:t>
+              <a:t>2020/8/31 Monday</a:t>
             </a:fld>
             <a:endParaRPr lang="zh-CN" altLang="en-US"/>
           </a:p>
@@ -3637,7 +3638,7 @@
             <a:graphicData uri="http://schemas.openxmlformats.org/presentationml/2006/ole">
               <mc:AlternateContent xmlns:mc="http://schemas.openxmlformats.org/markup-compatibility/2006">
                 <mc:Choice xmlns:v="urn:schemas-microsoft-com:vml" Requires="v">
-                  <p:oleObj spid="_x0000_s1046" name="AxMath" r:id="rId3" imgW="659520" imgH="218520" progId="Equation.AxMath">
+                  <p:oleObj spid="_x0000_s1078" name="AxMath" r:id="rId3" imgW="659520" imgH="218520" progId="Equation.AxMath">
                     <p:embed/>
                   </p:oleObj>
                 </mc:Choice>
@@ -3831,7 +3832,7 @@
             <a:graphicData uri="http://schemas.openxmlformats.org/presentationml/2006/ole">
               <mc:AlternateContent xmlns:mc="http://schemas.openxmlformats.org/markup-compatibility/2006">
                 <mc:Choice xmlns:v="urn:schemas-microsoft-com:vml" Requires="v">
-                  <p:oleObj spid="_x0000_s1047" name="AxMath" r:id="rId5" imgW="564120" imgH="218520" progId="Equation.AxMath">
+                  <p:oleObj spid="_x0000_s1079" name="AxMath" r:id="rId5" imgW="564120" imgH="218520" progId="Equation.AxMath">
                     <p:embed/>
                   </p:oleObj>
                 </mc:Choice>
@@ -3941,7 +3942,7 @@
             <a:graphicData uri="http://schemas.openxmlformats.org/presentationml/2006/ole">
               <mc:AlternateContent xmlns:mc="http://schemas.openxmlformats.org/markup-compatibility/2006">
                 <mc:Choice xmlns:v="urn:schemas-microsoft-com:vml" Requires="v">
-                  <p:oleObj spid="_x0000_s1048" name="AxMath" r:id="rId7" imgW="564120" imgH="218520" progId="Equation.AxMath">
+                  <p:oleObj spid="_x0000_s1080" name="AxMath" r:id="rId7" imgW="564120" imgH="218520" progId="Equation.AxMath">
                     <p:embed/>
                   </p:oleObj>
                 </mc:Choice>
@@ -4159,7 +4160,7 @@
             <a:graphicData uri="http://schemas.openxmlformats.org/presentationml/2006/ole">
               <mc:AlternateContent xmlns:mc="http://schemas.openxmlformats.org/markup-compatibility/2006">
                 <mc:Choice xmlns:v="urn:schemas-microsoft-com:vml" Requires="v">
-                  <p:oleObj spid="_x0000_s1049" name="AxMath" r:id="rId8" imgW="130680" imgH="207360" progId="Equation.AxMath">
+                  <p:oleObj spid="_x0000_s1081" name="AxMath" r:id="rId8" imgW="130680" imgH="207360" progId="Equation.AxMath">
                     <p:embed/>
                   </p:oleObj>
                 </mc:Choice>
@@ -5112,6 +5113,305 @@
 </p:sld>
 </file>
 
+<file path=ppt/slides/slide4.xml><?xml version="1.0" encoding="utf-8"?>
+<p:sld xmlns:a="http://schemas.openxmlformats.org/drawingml/2006/main" xmlns:r="http://schemas.openxmlformats.org/officeDocument/2006/relationships" xmlns:p="http://schemas.openxmlformats.org/presentationml/2006/main">
+  <p:cSld>
+    <p:spTree>
+      <p:nvGrpSpPr>
+        <p:cNvPr id="1" name=""/>
+        <p:cNvGrpSpPr/>
+        <p:nvPr/>
+      </p:nvGrpSpPr>
+      <p:grpSpPr>
+        <a:xfrm>
+          <a:off x="0" y="0"/>
+          <a:ext cx="0" cy="0"/>
+          <a:chOff x="0" y="0"/>
+          <a:chExt cx="0" cy="0"/>
+        </a:xfrm>
+      </p:grpSpPr>
+      <p:grpSp>
+        <p:nvGrpSpPr>
+          <p:cNvPr id="24" name="组合 23">
+            <a:extLst>
+              <a:ext uri="{FF2B5EF4-FFF2-40B4-BE49-F238E27FC236}">
+                <a16:creationId xmlns:a16="http://schemas.microsoft.com/office/drawing/2014/main" id="{5558BE5A-90A7-416B-917D-2100AE6E65FE}"/>
+              </a:ext>
+            </a:extLst>
+          </p:cNvPr>
+          <p:cNvGrpSpPr/>
+          <p:nvPr/>
+        </p:nvGrpSpPr>
+        <p:grpSpPr>
+          <a:xfrm>
+            <a:off x="3378527" y="394210"/>
+            <a:ext cx="5434945" cy="5735692"/>
+            <a:chOff x="3378527" y="394210"/>
+            <a:chExt cx="5434945" cy="5735692"/>
+          </a:xfrm>
+        </p:grpSpPr>
+        <p:pic>
+          <p:nvPicPr>
+            <p:cNvPr id="11" name="图片 10">
+              <a:extLst>
+                <a:ext uri="{FF2B5EF4-FFF2-40B4-BE49-F238E27FC236}">
+                  <a16:creationId xmlns:a16="http://schemas.microsoft.com/office/drawing/2014/main" id="{205A3139-CC95-45AA-B7B1-4CFB8A5052F3}"/>
+                </a:ext>
+              </a:extLst>
+            </p:cNvPr>
+            <p:cNvPicPr>
+              <a:picLocks noChangeAspect="1"/>
+            </p:cNvPicPr>
+            <p:nvPr/>
+          </p:nvPicPr>
+          <p:blipFill>
+            <a:blip r:embed="rId3"/>
+            <a:stretch>
+              <a:fillRect/>
+            </a:stretch>
+          </p:blipFill>
+          <p:spPr>
+            <a:xfrm>
+              <a:off x="3378527" y="394210"/>
+              <a:ext cx="5434945" cy="5735692"/>
+            </a:xfrm>
+            <a:prstGeom prst="rect">
+              <a:avLst/>
+            </a:prstGeom>
+          </p:spPr>
+        </p:pic>
+        <p:cxnSp>
+          <p:nvCxnSpPr>
+            <p:cNvPr id="19" name="直接箭头连接符 18">
+              <a:extLst>
+                <a:ext uri="{FF2B5EF4-FFF2-40B4-BE49-F238E27FC236}">
+                  <a16:creationId xmlns:a16="http://schemas.microsoft.com/office/drawing/2014/main" id="{F7A0646E-979C-4B84-881E-163EED4E6461}"/>
+                </a:ext>
+              </a:extLst>
+            </p:cNvPr>
+            <p:cNvCxnSpPr/>
+            <p:nvPr/>
+          </p:nvCxnSpPr>
+          <p:spPr>
+            <a:xfrm>
+              <a:off x="5056850" y="2619022"/>
+              <a:ext cx="0" cy="3510880"/>
+            </a:xfrm>
+            <a:prstGeom prst="straightConnector1">
+              <a:avLst/>
+            </a:prstGeom>
+            <a:ln w="63500">
+              <a:solidFill>
+                <a:srgbClr val="0070C0"/>
+              </a:solidFill>
+              <a:tailEnd type="triangle"/>
+            </a:ln>
+          </p:spPr>
+          <p:style>
+            <a:lnRef idx="1">
+              <a:schemeClr val="accent1"/>
+            </a:lnRef>
+            <a:fillRef idx="0">
+              <a:schemeClr val="accent1"/>
+            </a:fillRef>
+            <a:effectRef idx="0">
+              <a:schemeClr val="accent1"/>
+            </a:effectRef>
+            <a:fontRef idx="minor">
+              <a:schemeClr val="tx1"/>
+            </a:fontRef>
+          </p:style>
+        </p:cxnSp>
+        <p:cxnSp>
+          <p:nvCxnSpPr>
+            <p:cNvPr id="30" name="直接箭头连接符 29">
+              <a:extLst>
+                <a:ext uri="{FF2B5EF4-FFF2-40B4-BE49-F238E27FC236}">
+                  <a16:creationId xmlns:a16="http://schemas.microsoft.com/office/drawing/2014/main" id="{E2EC5D9D-6760-4A11-8914-4E9861161752}"/>
+                </a:ext>
+              </a:extLst>
+            </p:cNvPr>
+            <p:cNvCxnSpPr>
+              <a:cxnSpLocks/>
+            </p:cNvCxnSpPr>
+            <p:nvPr/>
+          </p:nvCxnSpPr>
+          <p:spPr>
+            <a:xfrm flipH="1">
+              <a:off x="3378527" y="2586709"/>
+              <a:ext cx="1678324" cy="0"/>
+            </a:xfrm>
+            <a:prstGeom prst="straightConnector1">
+              <a:avLst/>
+            </a:prstGeom>
+            <a:ln w="63500">
+              <a:solidFill>
+                <a:srgbClr val="0070C0"/>
+              </a:solidFill>
+              <a:tailEnd type="triangle"/>
+            </a:ln>
+          </p:spPr>
+          <p:style>
+            <a:lnRef idx="1">
+              <a:schemeClr val="accent1"/>
+            </a:lnRef>
+            <a:fillRef idx="0">
+              <a:schemeClr val="accent1"/>
+            </a:fillRef>
+            <a:effectRef idx="0">
+              <a:schemeClr val="accent1"/>
+            </a:effectRef>
+            <a:fontRef idx="minor">
+              <a:schemeClr val="tx1"/>
+            </a:fontRef>
+          </p:style>
+        </p:cxnSp>
+        <p:graphicFrame>
+          <p:nvGraphicFramePr>
+            <p:cNvPr id="22" name="对象 21">
+              <a:extLst>
+                <a:ext uri="{FF2B5EF4-FFF2-40B4-BE49-F238E27FC236}">
+                  <a16:creationId xmlns:a16="http://schemas.microsoft.com/office/drawing/2014/main" id="{C0F00609-236D-4B93-94EA-3DA4F74688F8}"/>
+                </a:ext>
+              </a:extLst>
+            </p:cNvPr>
+            <p:cNvGraphicFramePr>
+              <a:graphicFrameLocks noChangeAspect="1"/>
+            </p:cNvGraphicFramePr>
+            <p:nvPr>
+              <p:extLst>
+                <p:ext uri="{D42A27DB-BD31-4B8C-83A1-F6EECF244321}">
+                  <p14:modId xmlns:p14="http://schemas.microsoft.com/office/powerpoint/2010/main" val="2192780265"/>
+                </p:ext>
+              </p:extLst>
+            </p:nvPr>
+          </p:nvGraphicFramePr>
+          <p:xfrm>
+            <a:off x="3849326" y="1828342"/>
+            <a:ext cx="491180" cy="790680"/>
+          </p:xfrm>
+          <a:graphic>
+            <a:graphicData uri="http://schemas.openxmlformats.org/presentationml/2006/ole">
+              <mc:AlternateContent xmlns:mc="http://schemas.openxmlformats.org/markup-compatibility/2006">
+                <mc:Choice xmlns:v="urn:schemas-microsoft-com:vml" Requires="v">
+                  <p:oleObj spid="_x0000_s2060" name="AxMath" r:id="rId4" imgW="130680" imgH="208800" progId="Equation.AxMath">
+                    <p:embed/>
+                  </p:oleObj>
+                </mc:Choice>
+                <mc:Fallback>
+                  <p:oleObj name="AxMath" r:id="rId4" imgW="130680" imgH="208800" progId="Equation.AxMath">
+                    <p:embed/>
+                    <p:pic>
+                      <p:nvPicPr>
+                        <p:cNvPr id="0" name=""/>
+                        <p:cNvPicPr/>
+                        <p:nvPr/>
+                      </p:nvPicPr>
+                      <p:blipFill>
+                        <a:blip r:embed="rId5"/>
+                        <a:stretch>
+                          <a:fillRect/>
+                        </a:stretch>
+                      </p:blipFill>
+                      <p:spPr>
+                        <a:xfrm>
+                          <a:off x="3849326" y="1828342"/>
+                          <a:ext cx="491180" cy="790680"/>
+                        </a:xfrm>
+                        <a:prstGeom prst="rect">
+                          <a:avLst/>
+                        </a:prstGeom>
+                      </p:spPr>
+                    </p:pic>
+                  </p:oleObj>
+                </mc:Fallback>
+              </mc:AlternateContent>
+            </a:graphicData>
+          </a:graphic>
+        </p:graphicFrame>
+        <p:graphicFrame>
+          <p:nvGraphicFramePr>
+            <p:cNvPr id="23" name="对象 22">
+              <a:extLst>
+                <a:ext uri="{FF2B5EF4-FFF2-40B4-BE49-F238E27FC236}">
+                  <a16:creationId xmlns:a16="http://schemas.microsoft.com/office/drawing/2014/main" id="{59BCF83A-90A9-486A-B4A0-4E8733D118C9}"/>
+                </a:ext>
+              </a:extLst>
+            </p:cNvPr>
+            <p:cNvGraphicFramePr>
+              <a:graphicFrameLocks noChangeAspect="1"/>
+            </p:cNvGraphicFramePr>
+            <p:nvPr>
+              <p:extLst>
+                <p:ext uri="{D42A27DB-BD31-4B8C-83A1-F6EECF244321}">
+                  <p14:modId xmlns:p14="http://schemas.microsoft.com/office/powerpoint/2010/main" val="684679119"/>
+                </p:ext>
+              </p:extLst>
+            </p:nvPr>
+          </p:nvGraphicFramePr>
+          <p:xfrm>
+            <a:off x="4572000" y="3567113"/>
+            <a:ext cx="477838" cy="790575"/>
+          </p:xfrm>
+          <a:graphic>
+            <a:graphicData uri="http://schemas.openxmlformats.org/presentationml/2006/ole">
+              <mc:AlternateContent xmlns:mc="http://schemas.openxmlformats.org/markup-compatibility/2006">
+                <mc:Choice xmlns:v="urn:schemas-microsoft-com:vml" Requires="v">
+                  <p:oleObj spid="_x0000_s2061" name="AxMath" r:id="rId6" imgW="127440" imgH="208800" progId="Equation.AxMath">
+                    <p:embed/>
+                  </p:oleObj>
+                </mc:Choice>
+                <mc:Fallback>
+                  <p:oleObj name="AxMath" r:id="rId6" imgW="127440" imgH="208800" progId="Equation.AxMath">
+                    <p:embed/>
+                    <p:pic>
+                      <p:nvPicPr>
+                        <p:cNvPr id="22" name="对象 21">
+                          <a:extLst>
+                            <a:ext uri="{FF2B5EF4-FFF2-40B4-BE49-F238E27FC236}">
+                              <a16:creationId xmlns:a16="http://schemas.microsoft.com/office/drawing/2014/main" id="{C0F00609-236D-4B93-94EA-3DA4F74688F8}"/>
+                            </a:ext>
+                          </a:extLst>
+                        </p:cNvPr>
+                        <p:cNvPicPr/>
+                        <p:nvPr/>
+                      </p:nvPicPr>
+                      <p:blipFill>
+                        <a:blip r:embed="rId7"/>
+                        <a:stretch>
+                          <a:fillRect/>
+                        </a:stretch>
+                      </p:blipFill>
+                      <p:spPr>
+                        <a:xfrm>
+                          <a:off x="4572000" y="3567113"/>
+                          <a:ext cx="477838" cy="790575"/>
+                        </a:xfrm>
+                        <a:prstGeom prst="rect">
+                          <a:avLst/>
+                        </a:prstGeom>
+                      </p:spPr>
+                    </p:pic>
+                  </p:oleObj>
+                </mc:Fallback>
+              </mc:AlternateContent>
+            </a:graphicData>
+          </a:graphic>
+        </p:graphicFrame>
+      </p:grpSp>
+    </p:spTree>
+    <p:extLst>
+      <p:ext uri="{BB962C8B-B14F-4D97-AF65-F5344CB8AC3E}">
+        <p14:creationId xmlns:p14="http://schemas.microsoft.com/office/powerpoint/2010/main" val="3654183911"/>
+      </p:ext>
+    </p:extLst>
+  </p:cSld>
+  <p:clrMapOvr>
+    <a:masterClrMapping/>
+  </p:clrMapOvr>
+</p:sld>
+</file>
+
 <file path=ppt/theme/theme1.xml><?xml version="1.0" encoding="utf-8"?>
 <a:theme xmlns:a="http://schemas.openxmlformats.org/drawingml/2006/main" name="Office 主题​​">
   <a:themeElements>

</xml_diff>